<commit_message>
merge, update rho_vs_mu script.
</commit_message>
<xml_diff>
--- a/Summary/20220228_microbiome_demographic_slides.pptx
+++ b/Summary/20220228_microbiome_demographic_slides.pptx
@@ -147,7 +147,7 @@
 <file path=ppt/revisionInfo.xml><?xml version="1.0" encoding="utf-8"?>
 <p1510:revInfo xmlns:a="http://schemas.openxmlformats.org/drawingml/2006/main" xmlns:r="http://schemas.openxmlformats.org/officeDocument/2006/relationships" xmlns:p1510="http://schemas.microsoft.com/office/powerpoint/2015/10/main">
   <p1510:revLst>
-    <p1510:client id="{60E397E6-B1C2-4583-B107-A427D061C9B8}" v="24" dt="2022-02-28T22:39:49.715"/>
+    <p1510:client id="{60E397E6-B1C2-4583-B107-A427D061C9B8}" v="286" dt="2022-02-28T23:20:47.822"/>
   </p1510:revLst>
 </p1510:revInfo>
 </file>
@@ -157,7 +157,7 @@
   <pc:docChgLst>
     <pc:chgData name="Jonathan Mah" userId="5261b2f2f3e51194" providerId="LiveId" clId="{60E397E6-B1C2-4583-B107-A427D061C9B8}"/>
     <pc:docChg chg="custSel addSld delSld modSld modSection">
-      <pc:chgData name="Jonathan Mah" userId="5261b2f2f3e51194" providerId="LiveId" clId="{60E397E6-B1C2-4583-B107-A427D061C9B8}" dt="2022-02-28T22:46:37.851" v="1600" actId="20577"/>
+      <pc:chgData name="Jonathan Mah" userId="5261b2f2f3e51194" providerId="LiveId" clId="{60E397E6-B1C2-4583-B107-A427D061C9B8}" dt="2022-02-28T23:20:47.822" v="1862" actId="20577"/>
       <pc:docMkLst>
         <pc:docMk/>
       </pc:docMkLst>
@@ -232,6 +232,21 @@
           <pc:docMk/>
           <pc:sldMk cId="2099712768" sldId="391"/>
         </pc:sldMkLst>
+      </pc:sldChg>
+      <pc:sldChg chg="addSp modSp mod">
+        <pc:chgData name="Jonathan Mah" userId="5261b2f2f3e51194" providerId="LiveId" clId="{60E397E6-B1C2-4583-B107-A427D061C9B8}" dt="2022-02-28T23:17:53.220" v="1703" actId="20577"/>
+        <pc:sldMkLst>
+          <pc:docMk/>
+          <pc:sldMk cId="2797970704" sldId="392"/>
+        </pc:sldMkLst>
+        <pc:spChg chg="add mod">
+          <ac:chgData name="Jonathan Mah" userId="5261b2f2f3e51194" providerId="LiveId" clId="{60E397E6-B1C2-4583-B107-A427D061C9B8}" dt="2022-02-28T23:17:53.220" v="1703" actId="20577"/>
+          <ac:spMkLst>
+            <pc:docMk/>
+            <pc:sldMk cId="2797970704" sldId="392"/>
+            <ac:spMk id="2" creationId="{7C5B88DB-321D-4C7F-8B32-1B8D14A21102}"/>
+          </ac:spMkLst>
+        </pc:spChg>
       </pc:sldChg>
       <pc:sldChg chg="del">
         <pc:chgData name="Jonathan Mah" userId="5261b2f2f3e51194" providerId="LiveId" clId="{60E397E6-B1C2-4583-B107-A427D061C9B8}" dt="2022-02-28T22:20:36.607" v="4" actId="47"/>
@@ -361,11 +376,19 @@
         </pc:sldMkLst>
       </pc:sldChg>
       <pc:sldChg chg="addSp delSp modSp add mod">
-        <pc:chgData name="Jonathan Mah" userId="5261b2f2f3e51194" providerId="LiveId" clId="{60E397E6-B1C2-4583-B107-A427D061C9B8}" dt="2022-02-28T22:30:50.457" v="45"/>
+        <pc:chgData name="Jonathan Mah" userId="5261b2f2f3e51194" providerId="LiveId" clId="{60E397E6-B1C2-4583-B107-A427D061C9B8}" dt="2022-02-28T23:20:47.822" v="1862" actId="20577"/>
         <pc:sldMkLst>
           <pc:docMk/>
           <pc:sldMk cId="3584580800" sldId="404"/>
         </pc:sldMkLst>
+        <pc:spChg chg="add mod">
+          <ac:chgData name="Jonathan Mah" userId="5261b2f2f3e51194" providerId="LiveId" clId="{60E397E6-B1C2-4583-B107-A427D061C9B8}" dt="2022-02-28T23:20:47.822" v="1862" actId="20577"/>
+          <ac:spMkLst>
+            <pc:docMk/>
+            <pc:sldMk cId="3584580800" sldId="404"/>
+            <ac:spMk id="2" creationId="{08A20C09-648C-44FE-837C-FEB3D847C193}"/>
+          </ac:spMkLst>
+        </pc:spChg>
         <pc:graphicFrameChg chg="mod modGraphic">
           <ac:chgData name="Jonathan Mah" userId="5261b2f2f3e51194" providerId="LiveId" clId="{60E397E6-B1C2-4583-B107-A427D061C9B8}" dt="2022-02-28T22:30:50.457" v="45"/>
           <ac:graphicFrameMkLst>
@@ -4568,20 +4591,20 @@
           <a:lstStyle/>
           <a:p>
             <a:r>
-              <a:rPr lang="en-US" dirty="0" err="1">
+              <a:rPr lang="en-US" err="1">
                 <a:latin typeface="Yu Gothic" panose="020B0400000000000000" pitchFamily="34" charset="-128"/>
                 <a:ea typeface="Yu Gothic" panose="020B0400000000000000" pitchFamily="34" charset="-128"/>
               </a:rPr>
               <a:t>demo_for_ccgb</a:t>
             </a:r>
             <a:br>
-              <a:rPr lang="en-US" dirty="0">
+              <a:rPr lang="en-US">
                 <a:latin typeface="Yu Gothic" panose="020B0400000000000000" pitchFamily="34" charset="-128"/>
                 <a:ea typeface="Yu Gothic" panose="020B0400000000000000" pitchFamily="34" charset="-128"/>
               </a:rPr>
             </a:br>
             <a:r>
-              <a:rPr lang="en-US" dirty="0">
+              <a:rPr lang="en-US">
                 <a:latin typeface="Yu Gothic" panose="020B0400000000000000" pitchFamily="34" charset="-128"/>
                 <a:ea typeface="Yu Gothic" panose="020B0400000000000000" pitchFamily="34" charset="-128"/>
               </a:rPr>
@@ -4612,7 +4635,7 @@
           <a:lstStyle/>
           <a:p>
             <a:r>
-              <a:rPr lang="en-US" dirty="0">
+              <a:rPr lang="en-US">
                 <a:solidFill>
                   <a:schemeClr val="tx1">
                     <a:lumMod val="50000"/>
@@ -4627,7 +4650,7 @@
           </a:p>
           <a:p>
             <a:r>
-              <a:rPr lang="en-US" dirty="0">
+              <a:rPr lang="en-US">
                 <a:solidFill>
                   <a:schemeClr val="tx1">
                     <a:lumMod val="50000"/>
@@ -4642,7 +4665,7 @@
           </a:p>
           <a:p>
             <a:r>
-              <a:rPr lang="en-US" dirty="0">
+              <a:rPr lang="en-US">
                 <a:solidFill>
                   <a:schemeClr val="tx1">
                     <a:lumMod val="50000"/>
@@ -4709,7 +4732,7 @@
           <a:lstStyle/>
           <a:p>
             <a:r>
-              <a:rPr lang="en-US" dirty="0"/>
+              <a:rPr lang="en-US"/>
               <a:t>Thoughts</a:t>
             </a:r>
           </a:p>
@@ -4737,26 +4760,26 @@
           <a:lstStyle/>
           <a:p>
             <a:r>
-              <a:rPr lang="en-US" dirty="0"/>
+              <a:rPr lang="en-US"/>
               <a:t>More complex models don’t seem to fit especially better in terms of likelihood or SFS than two-epoch models (but still fit better than one-epoch models)</a:t>
             </a:r>
           </a:p>
           <a:p>
             <a:r>
-              <a:rPr lang="en-US" dirty="0"/>
+              <a:rPr lang="en-US"/>
               <a:t>Inferences still consistently suggest an expansion on a time-scale coincident with 10,000-20,000 years ago</a:t>
             </a:r>
           </a:p>
           <a:p>
-            <a:endParaRPr lang="en-US" dirty="0"/>
-          </a:p>
-          <a:p>
-            <a:endParaRPr lang="en-US" dirty="0"/>
+            <a:endParaRPr lang="en-US"/>
+          </a:p>
+          <a:p>
+            <a:endParaRPr lang="en-US"/>
           </a:p>
         </p:txBody>
       </p:sp>
-      <mc:AlternateContent xmlns:mc="http://schemas.openxmlformats.org/markup-compatibility/2006" xmlns:p14="http://schemas.microsoft.com/office/powerpoint/2010/main">
-        <mc:Choice Requires="p14">
+      <mc:AlternateContent xmlns:mc="http://schemas.openxmlformats.org/markup-compatibility/2006">
+        <mc:Choice xmlns:p14="http://schemas.microsoft.com/office/powerpoint/2010/main" Requires="p14">
           <p:contentPart p14:bwMode="auto" r:id="rId2">
             <p14:nvContentPartPr>
               <p14:cNvPr id="4" name="Ink 3">
@@ -4775,7 +4798,7 @@
             </p14:xfrm>
           </p:contentPart>
         </mc:Choice>
-        <mc:Fallback xmlns="">
+        <mc:Fallback>
           <p:pic>
             <p:nvPicPr>
               <p:cNvPr id="4" name="Ink 3">
@@ -4806,8 +4829,8 @@
           </p:pic>
         </mc:Fallback>
       </mc:AlternateContent>
-      <mc:AlternateContent xmlns:mc="http://schemas.openxmlformats.org/markup-compatibility/2006" xmlns:p14="http://schemas.microsoft.com/office/powerpoint/2010/main">
-        <mc:Choice Requires="p14">
+      <mc:AlternateContent xmlns:mc="http://schemas.openxmlformats.org/markup-compatibility/2006">
+        <mc:Choice xmlns:p14="http://schemas.microsoft.com/office/powerpoint/2010/main" Requires="p14">
           <p:contentPart p14:bwMode="auto" r:id="rId4">
             <p14:nvContentPartPr>
               <p14:cNvPr id="5" name="Ink 4">
@@ -4826,7 +4849,7 @@
             </p14:xfrm>
           </p:contentPart>
         </mc:Choice>
-        <mc:Fallback xmlns="">
+        <mc:Fallback>
           <p:pic>
             <p:nvPicPr>
               <p:cNvPr id="5" name="Ink 4">
@@ -4857,8 +4880,8 @@
           </p:pic>
         </mc:Fallback>
       </mc:AlternateContent>
-      <mc:AlternateContent xmlns:mc="http://schemas.openxmlformats.org/markup-compatibility/2006" xmlns:p14="http://schemas.microsoft.com/office/powerpoint/2010/main">
-        <mc:Choice Requires="p14">
+      <mc:AlternateContent xmlns:mc="http://schemas.openxmlformats.org/markup-compatibility/2006">
+        <mc:Choice xmlns:p14="http://schemas.microsoft.com/office/powerpoint/2010/main" Requires="p14">
           <p:contentPart p14:bwMode="auto" r:id="rId5">
             <p14:nvContentPartPr>
               <p14:cNvPr id="6" name="Ink 5">
@@ -4877,7 +4900,7 @@
             </p14:xfrm>
           </p:contentPart>
         </mc:Choice>
-        <mc:Fallback xmlns="">
+        <mc:Fallback>
           <p:pic>
             <p:nvPicPr>
               <p:cNvPr id="6" name="Ink 5">
@@ -4891,7 +4914,7 @@
               <p:nvPr/>
             </p:nvPicPr>
             <p:blipFill>
-              <a:blip r:embed="rId3"/>
+              <a:blip r:embed="rId6"/>
               <a:stretch>
                 <a:fillRect/>
               </a:stretch>
@@ -4908,9 +4931,9 @@
           </p:pic>
         </mc:Fallback>
       </mc:AlternateContent>
-      <mc:AlternateContent xmlns:mc="http://schemas.openxmlformats.org/markup-compatibility/2006" xmlns:p14="http://schemas.microsoft.com/office/powerpoint/2010/main">
-        <mc:Choice Requires="p14">
-          <p:contentPart p14:bwMode="auto" r:id="rId6">
+      <mc:AlternateContent xmlns:mc="http://schemas.openxmlformats.org/markup-compatibility/2006">
+        <mc:Choice xmlns:p14="http://schemas.microsoft.com/office/powerpoint/2010/main" Requires="p14">
+          <p:contentPart p14:bwMode="auto" r:id="rId7">
             <p14:nvContentPartPr>
               <p14:cNvPr id="7" name="Ink 6">
                 <a:extLst>
@@ -4928,7 +4951,7 @@
             </p14:xfrm>
           </p:contentPart>
         </mc:Choice>
-        <mc:Fallback xmlns="">
+        <mc:Fallback>
           <p:pic>
             <p:nvPicPr>
               <p:cNvPr id="7" name="Ink 6">
@@ -4979,9 +5002,9 @@
             <a:chExt cx="360" cy="360"/>
           </a:xfrm>
         </p:grpSpPr>
-        <mc:AlternateContent xmlns:mc="http://schemas.openxmlformats.org/markup-compatibility/2006" xmlns:p14="http://schemas.microsoft.com/office/powerpoint/2010/main">
-          <mc:Choice Requires="p14">
-            <p:contentPart p14:bwMode="auto" r:id="rId7">
+        <mc:AlternateContent xmlns:mc="http://schemas.openxmlformats.org/markup-compatibility/2006">
+          <mc:Choice xmlns:p14="http://schemas.microsoft.com/office/powerpoint/2010/main" Requires="p14">
+            <p:contentPart p14:bwMode="auto" r:id="rId8">
               <p14:nvContentPartPr>
                 <p14:cNvPr id="8" name="Ink 7">
                   <a:extLst>
@@ -4999,7 +5022,7 @@
               </p14:xfrm>
             </p:contentPart>
           </mc:Choice>
-          <mc:Fallback xmlns="">
+          <mc:Fallback>
             <p:pic>
               <p:nvPicPr>
                 <p:cNvPr id="8" name="Ink 7">
@@ -5030,9 +5053,9 @@
             </p:pic>
           </mc:Fallback>
         </mc:AlternateContent>
-        <mc:AlternateContent xmlns:mc="http://schemas.openxmlformats.org/markup-compatibility/2006" xmlns:p14="http://schemas.microsoft.com/office/powerpoint/2010/main">
-          <mc:Choice Requires="p14">
-            <p:contentPart p14:bwMode="auto" r:id="rId8">
+        <mc:AlternateContent xmlns:mc="http://schemas.openxmlformats.org/markup-compatibility/2006">
+          <mc:Choice xmlns:p14="http://schemas.microsoft.com/office/powerpoint/2010/main" Requires="p14">
+            <p:contentPart p14:bwMode="auto" r:id="rId9">
               <p14:nvContentPartPr>
                 <p14:cNvPr id="9" name="Ink 8">
                   <a:extLst>
@@ -5050,7 +5073,7 @@
               </p14:xfrm>
             </p:contentPart>
           </mc:Choice>
-          <mc:Fallback xmlns="">
+          <mc:Fallback>
             <p:pic>
               <p:nvPicPr>
                 <p:cNvPr id="9" name="Ink 8">
@@ -5081,9 +5104,9 @@
             </p:pic>
           </mc:Fallback>
         </mc:AlternateContent>
-        <mc:AlternateContent xmlns:mc="http://schemas.openxmlformats.org/markup-compatibility/2006" xmlns:p14="http://schemas.microsoft.com/office/powerpoint/2010/main">
-          <mc:Choice Requires="p14">
-            <p:contentPart p14:bwMode="auto" r:id="rId9">
+        <mc:AlternateContent xmlns:mc="http://schemas.openxmlformats.org/markup-compatibility/2006">
+          <mc:Choice xmlns:p14="http://schemas.microsoft.com/office/powerpoint/2010/main" Requires="p14">
+            <p:contentPart p14:bwMode="auto" r:id="rId10">
               <p14:nvContentPartPr>
                 <p14:cNvPr id="10" name="Ink 9">
                   <a:extLst>
@@ -5101,7 +5124,7 @@
               </p14:xfrm>
             </p:contentPart>
           </mc:Choice>
-          <mc:Fallback xmlns="">
+          <mc:Fallback>
             <p:pic>
               <p:nvPicPr>
                 <p:cNvPr id="10" name="Ink 9">
@@ -5133,9 +5156,9 @@
           </mc:Fallback>
         </mc:AlternateContent>
       </p:grpSp>
-      <mc:AlternateContent xmlns:mc="http://schemas.openxmlformats.org/markup-compatibility/2006" xmlns:p14="http://schemas.microsoft.com/office/powerpoint/2010/main">
-        <mc:Choice Requires="p14">
-          <p:contentPart p14:bwMode="auto" r:id="rId10">
+      <mc:AlternateContent xmlns:mc="http://schemas.openxmlformats.org/markup-compatibility/2006">
+        <mc:Choice xmlns:p14="http://schemas.microsoft.com/office/powerpoint/2010/main" Requires="p14">
+          <p:contentPart p14:bwMode="auto" r:id="rId11">
             <p14:nvContentPartPr>
               <p14:cNvPr id="11" name="Ink 10">
                 <a:extLst>
@@ -5153,7 +5176,7 @@
             </p14:xfrm>
           </p:contentPart>
         </mc:Choice>
-        <mc:Fallback xmlns="">
+        <mc:Fallback>
           <p:pic>
             <p:nvPicPr>
               <p:cNvPr id="11" name="Ink 10">
@@ -5204,9 +5227,9 @@
             <a:chExt cx="360" cy="360"/>
           </a:xfrm>
         </p:grpSpPr>
-        <mc:AlternateContent xmlns:mc="http://schemas.openxmlformats.org/markup-compatibility/2006" xmlns:p14="http://schemas.microsoft.com/office/powerpoint/2010/main">
-          <mc:Choice Requires="p14">
-            <p:contentPart p14:bwMode="auto" r:id="rId11">
+        <mc:AlternateContent xmlns:mc="http://schemas.openxmlformats.org/markup-compatibility/2006">
+          <mc:Choice xmlns:p14="http://schemas.microsoft.com/office/powerpoint/2010/main" Requires="p14">
+            <p:contentPart p14:bwMode="auto" r:id="rId12">
               <p14:nvContentPartPr>
                 <p14:cNvPr id="12" name="Ink 11">
                   <a:extLst>
@@ -5224,7 +5247,7 @@
               </p14:xfrm>
             </p:contentPart>
           </mc:Choice>
-          <mc:Fallback xmlns="">
+          <mc:Fallback>
             <p:pic>
               <p:nvPicPr>
                 <p:cNvPr id="12" name="Ink 11">
@@ -5238,7 +5261,7 @@
                 <p:nvPr/>
               </p:nvPicPr>
               <p:blipFill>
-                <a:blip r:embed="rId3"/>
+                <a:blip r:embed="rId6"/>
                 <a:stretch>
                   <a:fillRect/>
                 </a:stretch>
@@ -5255,9 +5278,9 @@
             </p:pic>
           </mc:Fallback>
         </mc:AlternateContent>
-        <mc:AlternateContent xmlns:mc="http://schemas.openxmlformats.org/markup-compatibility/2006" xmlns:p14="http://schemas.microsoft.com/office/powerpoint/2010/main">
-          <mc:Choice Requires="p14">
-            <p:contentPart p14:bwMode="auto" r:id="rId12">
+        <mc:AlternateContent xmlns:mc="http://schemas.openxmlformats.org/markup-compatibility/2006">
+          <mc:Choice xmlns:p14="http://schemas.microsoft.com/office/powerpoint/2010/main" Requires="p14">
+            <p:contentPart p14:bwMode="auto" r:id="rId13">
               <p14:nvContentPartPr>
                 <p14:cNvPr id="13" name="Ink 12">
                   <a:extLst>
@@ -5275,7 +5298,7 @@
               </p14:xfrm>
             </p:contentPart>
           </mc:Choice>
-          <mc:Fallback xmlns="">
+          <mc:Fallback>
             <p:pic>
               <p:nvPicPr>
                 <p:cNvPr id="13" name="Ink 12">
@@ -5289,7 +5312,7 @@
                 <p:nvPr/>
               </p:nvPicPr>
               <p:blipFill>
-                <a:blip r:embed="rId3"/>
+                <a:blip r:embed="rId6"/>
                 <a:stretch>
                   <a:fillRect/>
                 </a:stretch>
@@ -5389,107 +5412,107 @@
           <a:lstStyle/>
           <a:p>
             <a:r>
-              <a:rPr lang="en-US" dirty="0"/>
+              <a:rPr lang="en-US"/>
               <a:t>Look into confidence intervals</a:t>
             </a:r>
           </a:p>
           <a:p>
             <a:pPr lvl="1"/>
             <a:r>
-              <a:rPr lang="en-US" dirty="0"/>
+              <a:rPr lang="en-US"/>
               <a:t>Poisson sample SFS</a:t>
             </a:r>
           </a:p>
           <a:p>
             <a:pPr lvl="2"/>
             <a:r>
-              <a:rPr lang="en-US" dirty="0" err="1"/>
+              <a:rPr lang="en-US" err="1"/>
               <a:t>Dadi.Spectrum_mod.sample</a:t>
             </a:r>
             <a:r>
-              <a:rPr lang="en-US" dirty="0"/>
+              <a:rPr lang="en-US"/>
               <a:t>(self)</a:t>
             </a:r>
           </a:p>
           <a:p>
             <a:pPr lvl="1"/>
             <a:r>
-              <a:rPr lang="en-US" dirty="0"/>
+              <a:rPr lang="en-US"/>
               <a:t>Bootstrap VCF</a:t>
             </a:r>
           </a:p>
           <a:p>
             <a:pPr lvl="1"/>
             <a:r>
-              <a:rPr lang="en-US" dirty="0"/>
+              <a:rPr lang="en-US"/>
               <a:t>1000 SFS’s, run MLE inference on each SFS, 5% and 95% of </a:t>
             </a:r>
             <a:r>
-              <a:rPr lang="en-US" b="1" dirty="0"/>
+              <a:rPr lang="en-US" b="1"/>
               <a:t>param space</a:t>
             </a:r>
             <a:r>
-              <a:rPr lang="en-US" dirty="0"/>
+              <a:rPr lang="en-US"/>
               <a:t> is our CI</a:t>
             </a:r>
           </a:p>
           <a:p>
             <a:r>
-              <a:rPr lang="en-US" dirty="0"/>
+              <a:rPr lang="en-US"/>
               <a:t>By end of quarter:</a:t>
             </a:r>
           </a:p>
           <a:p>
             <a:pPr lvl="1"/>
             <a:r>
-              <a:rPr lang="en-US" dirty="0"/>
+              <a:rPr lang="en-US"/>
               <a:t>Try and finish fecal analysis</a:t>
             </a:r>
           </a:p>
           <a:p>
             <a:pPr lvl="1"/>
             <a:r>
-              <a:rPr lang="en-US" dirty="0"/>
+              <a:rPr lang="en-US"/>
               <a:t>Try and finish MIDAS stuff</a:t>
             </a:r>
           </a:p>
           <a:p>
             <a:r>
-              <a:rPr lang="en-US" dirty="0"/>
+              <a:rPr lang="en-US"/>
               <a:t>Look at </a:t>
             </a:r>
             <a:r>
-              <a:rPr lang="en-US" dirty="0" err="1"/>
+              <a:rPr lang="en-US" err="1"/>
               <a:t>sparsing</a:t>
             </a:r>
             <a:r>
-              <a:rPr lang="en-US" dirty="0"/>
+              <a:rPr lang="en-US"/>
               <a:t> SFS</a:t>
             </a:r>
           </a:p>
           <a:p>
             <a:r>
-              <a:rPr lang="en-US" dirty="0"/>
+              <a:rPr lang="en-US"/>
               <a:t>Instead of doing all the populations and models, just take a closer look at two</a:t>
             </a:r>
           </a:p>
           <a:p>
             <a:pPr lvl="1"/>
             <a:r>
-              <a:rPr lang="en-US" dirty="0"/>
+              <a:rPr lang="en-US"/>
               <a:t>Search space really well</a:t>
             </a:r>
           </a:p>
           <a:p>
-            <a:endParaRPr lang="en-US" dirty="0"/>
-          </a:p>
-          <a:p>
-            <a:endParaRPr lang="en-US" dirty="0"/>
+            <a:endParaRPr lang="en-US"/>
+          </a:p>
+          <a:p>
+            <a:endParaRPr lang="en-US"/>
           </a:p>
         </p:txBody>
       </p:sp>
-      <mc:AlternateContent xmlns:mc="http://schemas.openxmlformats.org/markup-compatibility/2006" xmlns:p14="http://schemas.microsoft.com/office/powerpoint/2010/main">
-        <mc:Choice Requires="p14">
+      <mc:AlternateContent xmlns:mc="http://schemas.openxmlformats.org/markup-compatibility/2006">
+        <mc:Choice xmlns:p14="http://schemas.microsoft.com/office/powerpoint/2010/main" Requires="p14">
           <p:contentPart p14:bwMode="auto" r:id="rId2">
             <p14:nvContentPartPr>
               <p14:cNvPr id="4" name="Ink 3">
@@ -5508,7 +5531,7 @@
             </p14:xfrm>
           </p:contentPart>
         </mc:Choice>
-        <mc:Fallback xmlns="">
+        <mc:Fallback>
           <p:pic>
             <p:nvPicPr>
               <p:cNvPr id="4" name="Ink 3">
@@ -5539,8 +5562,8 @@
           </p:pic>
         </mc:Fallback>
       </mc:AlternateContent>
-      <mc:AlternateContent xmlns:mc="http://schemas.openxmlformats.org/markup-compatibility/2006" xmlns:p14="http://schemas.microsoft.com/office/powerpoint/2010/main">
-        <mc:Choice Requires="p14">
+      <mc:AlternateContent xmlns:mc="http://schemas.openxmlformats.org/markup-compatibility/2006">
+        <mc:Choice xmlns:p14="http://schemas.microsoft.com/office/powerpoint/2010/main" Requires="p14">
           <p:contentPart p14:bwMode="auto" r:id="rId4">
             <p14:nvContentPartPr>
               <p14:cNvPr id="5" name="Ink 4">
@@ -5559,7 +5582,7 @@
             </p14:xfrm>
           </p:contentPart>
         </mc:Choice>
-        <mc:Fallback xmlns="">
+        <mc:Fallback>
           <p:pic>
             <p:nvPicPr>
               <p:cNvPr id="5" name="Ink 4">
@@ -5590,8 +5613,8 @@
           </p:pic>
         </mc:Fallback>
       </mc:AlternateContent>
-      <mc:AlternateContent xmlns:mc="http://schemas.openxmlformats.org/markup-compatibility/2006" xmlns:p14="http://schemas.microsoft.com/office/powerpoint/2010/main">
-        <mc:Choice Requires="p14">
+      <mc:AlternateContent xmlns:mc="http://schemas.openxmlformats.org/markup-compatibility/2006">
+        <mc:Choice xmlns:p14="http://schemas.microsoft.com/office/powerpoint/2010/main" Requires="p14">
           <p:contentPart p14:bwMode="auto" r:id="rId5">
             <p14:nvContentPartPr>
               <p14:cNvPr id="6" name="Ink 5">
@@ -5610,7 +5633,7 @@
             </p14:xfrm>
           </p:contentPart>
         </mc:Choice>
-        <mc:Fallback xmlns="">
+        <mc:Fallback>
           <p:pic>
             <p:nvPicPr>
               <p:cNvPr id="6" name="Ink 5">
@@ -5624,7 +5647,7 @@
               <p:nvPr/>
             </p:nvPicPr>
             <p:blipFill>
-              <a:blip r:embed="rId3"/>
+              <a:blip r:embed="rId6"/>
               <a:stretch>
                 <a:fillRect/>
               </a:stretch>
@@ -5641,9 +5664,9 @@
           </p:pic>
         </mc:Fallback>
       </mc:AlternateContent>
-      <mc:AlternateContent xmlns:mc="http://schemas.openxmlformats.org/markup-compatibility/2006" xmlns:p14="http://schemas.microsoft.com/office/powerpoint/2010/main">
-        <mc:Choice Requires="p14">
-          <p:contentPart p14:bwMode="auto" r:id="rId6">
+      <mc:AlternateContent xmlns:mc="http://schemas.openxmlformats.org/markup-compatibility/2006">
+        <mc:Choice xmlns:p14="http://schemas.microsoft.com/office/powerpoint/2010/main" Requires="p14">
+          <p:contentPart p14:bwMode="auto" r:id="rId7">
             <p14:nvContentPartPr>
               <p14:cNvPr id="7" name="Ink 6">
                 <a:extLst>
@@ -5661,7 +5684,7 @@
             </p14:xfrm>
           </p:contentPart>
         </mc:Choice>
-        <mc:Fallback xmlns="">
+        <mc:Fallback>
           <p:pic>
             <p:nvPicPr>
               <p:cNvPr id="7" name="Ink 6">
@@ -5712,9 +5735,9 @@
             <a:chExt cx="360" cy="360"/>
           </a:xfrm>
         </p:grpSpPr>
-        <mc:AlternateContent xmlns:mc="http://schemas.openxmlformats.org/markup-compatibility/2006" xmlns:p14="http://schemas.microsoft.com/office/powerpoint/2010/main">
-          <mc:Choice Requires="p14">
-            <p:contentPart p14:bwMode="auto" r:id="rId7">
+        <mc:AlternateContent xmlns:mc="http://schemas.openxmlformats.org/markup-compatibility/2006">
+          <mc:Choice xmlns:p14="http://schemas.microsoft.com/office/powerpoint/2010/main" Requires="p14">
+            <p:contentPart p14:bwMode="auto" r:id="rId8">
               <p14:nvContentPartPr>
                 <p14:cNvPr id="8" name="Ink 7">
                   <a:extLst>
@@ -5732,7 +5755,7 @@
               </p14:xfrm>
             </p:contentPart>
           </mc:Choice>
-          <mc:Fallback xmlns="">
+          <mc:Fallback>
             <p:pic>
               <p:nvPicPr>
                 <p:cNvPr id="8" name="Ink 7">
@@ -5763,9 +5786,9 @@
             </p:pic>
           </mc:Fallback>
         </mc:AlternateContent>
-        <mc:AlternateContent xmlns:mc="http://schemas.openxmlformats.org/markup-compatibility/2006" xmlns:p14="http://schemas.microsoft.com/office/powerpoint/2010/main">
-          <mc:Choice Requires="p14">
-            <p:contentPart p14:bwMode="auto" r:id="rId8">
+        <mc:AlternateContent xmlns:mc="http://schemas.openxmlformats.org/markup-compatibility/2006">
+          <mc:Choice xmlns:p14="http://schemas.microsoft.com/office/powerpoint/2010/main" Requires="p14">
+            <p:contentPart p14:bwMode="auto" r:id="rId9">
               <p14:nvContentPartPr>
                 <p14:cNvPr id="9" name="Ink 8">
                   <a:extLst>
@@ -5783,7 +5806,7 @@
               </p14:xfrm>
             </p:contentPart>
           </mc:Choice>
-          <mc:Fallback xmlns="">
+          <mc:Fallback>
             <p:pic>
               <p:nvPicPr>
                 <p:cNvPr id="9" name="Ink 8">
@@ -5814,9 +5837,9 @@
             </p:pic>
           </mc:Fallback>
         </mc:AlternateContent>
-        <mc:AlternateContent xmlns:mc="http://schemas.openxmlformats.org/markup-compatibility/2006" xmlns:p14="http://schemas.microsoft.com/office/powerpoint/2010/main">
-          <mc:Choice Requires="p14">
-            <p:contentPart p14:bwMode="auto" r:id="rId9">
+        <mc:AlternateContent xmlns:mc="http://schemas.openxmlformats.org/markup-compatibility/2006">
+          <mc:Choice xmlns:p14="http://schemas.microsoft.com/office/powerpoint/2010/main" Requires="p14">
+            <p:contentPart p14:bwMode="auto" r:id="rId10">
               <p14:nvContentPartPr>
                 <p14:cNvPr id="10" name="Ink 9">
                   <a:extLst>
@@ -5834,7 +5857,7 @@
               </p14:xfrm>
             </p:contentPart>
           </mc:Choice>
-          <mc:Fallback xmlns="">
+          <mc:Fallback>
             <p:pic>
               <p:nvPicPr>
                 <p:cNvPr id="10" name="Ink 9">
@@ -5866,9 +5889,9 @@
           </mc:Fallback>
         </mc:AlternateContent>
       </p:grpSp>
-      <mc:AlternateContent xmlns:mc="http://schemas.openxmlformats.org/markup-compatibility/2006" xmlns:p14="http://schemas.microsoft.com/office/powerpoint/2010/main">
-        <mc:Choice Requires="p14">
-          <p:contentPart p14:bwMode="auto" r:id="rId10">
+      <mc:AlternateContent xmlns:mc="http://schemas.openxmlformats.org/markup-compatibility/2006">
+        <mc:Choice xmlns:p14="http://schemas.microsoft.com/office/powerpoint/2010/main" Requires="p14">
+          <p:contentPart p14:bwMode="auto" r:id="rId11">
             <p14:nvContentPartPr>
               <p14:cNvPr id="11" name="Ink 10">
                 <a:extLst>
@@ -5886,7 +5909,7 @@
             </p14:xfrm>
           </p:contentPart>
         </mc:Choice>
-        <mc:Fallback xmlns="">
+        <mc:Fallback>
           <p:pic>
             <p:nvPicPr>
               <p:cNvPr id="11" name="Ink 10">
@@ -5937,9 +5960,9 @@
             <a:chExt cx="360" cy="360"/>
           </a:xfrm>
         </p:grpSpPr>
-        <mc:AlternateContent xmlns:mc="http://schemas.openxmlformats.org/markup-compatibility/2006" xmlns:p14="http://schemas.microsoft.com/office/powerpoint/2010/main">
-          <mc:Choice Requires="p14">
-            <p:contentPart p14:bwMode="auto" r:id="rId11">
+        <mc:AlternateContent xmlns:mc="http://schemas.openxmlformats.org/markup-compatibility/2006">
+          <mc:Choice xmlns:p14="http://schemas.microsoft.com/office/powerpoint/2010/main" Requires="p14">
+            <p:contentPart p14:bwMode="auto" r:id="rId12">
               <p14:nvContentPartPr>
                 <p14:cNvPr id="12" name="Ink 11">
                   <a:extLst>
@@ -5957,7 +5980,7 @@
               </p14:xfrm>
             </p:contentPart>
           </mc:Choice>
-          <mc:Fallback xmlns="">
+          <mc:Fallback>
             <p:pic>
               <p:nvPicPr>
                 <p:cNvPr id="12" name="Ink 11">
@@ -5971,7 +5994,7 @@
                 <p:nvPr/>
               </p:nvPicPr>
               <p:blipFill>
-                <a:blip r:embed="rId3"/>
+                <a:blip r:embed="rId6"/>
                 <a:stretch>
                   <a:fillRect/>
                 </a:stretch>
@@ -5988,9 +6011,9 @@
             </p:pic>
           </mc:Fallback>
         </mc:AlternateContent>
-        <mc:AlternateContent xmlns:mc="http://schemas.openxmlformats.org/markup-compatibility/2006" xmlns:p14="http://schemas.microsoft.com/office/powerpoint/2010/main">
-          <mc:Choice Requires="p14">
-            <p:contentPart p14:bwMode="auto" r:id="rId12">
+        <mc:AlternateContent xmlns:mc="http://schemas.openxmlformats.org/markup-compatibility/2006">
+          <mc:Choice xmlns:p14="http://schemas.microsoft.com/office/powerpoint/2010/main" Requires="p14">
+            <p:contentPart p14:bwMode="auto" r:id="rId13">
               <p14:nvContentPartPr>
                 <p14:cNvPr id="13" name="Ink 12">
                   <a:extLst>
@@ -6008,7 +6031,7 @@
               </p14:xfrm>
             </p:contentPart>
           </mc:Choice>
-          <mc:Fallback xmlns="">
+          <mc:Fallback>
             <p:pic>
               <p:nvPicPr>
                 <p:cNvPr id="13" name="Ink 12">
@@ -6022,7 +6045,7 @@
                 <p:nvPr/>
               </p:nvPicPr>
               <p:blipFill>
-                <a:blip r:embed="rId3"/>
+                <a:blip r:embed="rId6"/>
                 <a:stretch>
                   <a:fillRect/>
                 </a:stretch>
@@ -6125,21 +6148,21 @@
           <a:lstStyle/>
           <a:p>
             <a:r>
-              <a:rPr lang="en-US" dirty="0">
+              <a:rPr lang="en-US">
                 <a:latin typeface="Yu Gothic" panose="020B0400000000000000" pitchFamily="34" charset="-128"/>
                 <a:ea typeface="Yu Gothic" panose="020B0400000000000000" pitchFamily="34" charset="-128"/>
               </a:rPr>
               <a:t>Species step, DFE analysis, genes + </a:t>
             </a:r>
             <a:r>
-              <a:rPr lang="en-US" dirty="0" err="1">
+              <a:rPr lang="en-US" err="1">
                 <a:latin typeface="Yu Gothic" panose="020B0400000000000000" pitchFamily="34" charset="-128"/>
                 <a:ea typeface="Yu Gothic" panose="020B0400000000000000" pitchFamily="34" charset="-128"/>
               </a:rPr>
               <a:t>snps</a:t>
             </a:r>
             <a:r>
-              <a:rPr lang="en-US" dirty="0">
+              <a:rPr lang="en-US">
                 <a:latin typeface="Yu Gothic" panose="020B0400000000000000" pitchFamily="34" charset="-128"/>
                 <a:ea typeface="Yu Gothic" panose="020B0400000000000000" pitchFamily="34" charset="-128"/>
               </a:rPr>
@@ -6148,7 +6171,7 @@
           </a:p>
           <a:p>
             <a:r>
-              <a:rPr lang="en-US" dirty="0">
+              <a:rPr lang="en-US">
                 <a:latin typeface="Yu Gothic" panose="020B0400000000000000" pitchFamily="34" charset="-128"/>
                 <a:ea typeface="Yu Gothic" panose="020B0400000000000000" pitchFamily="34" charset="-128"/>
               </a:rPr>
@@ -6158,7 +6181,7 @@
           <a:p>
             <a:pPr lvl="1"/>
             <a:r>
-              <a:rPr lang="en-US" dirty="0">
+              <a:rPr lang="en-US">
                 <a:latin typeface="Yu Gothic" panose="020B0400000000000000" pitchFamily="34" charset="-128"/>
                 <a:ea typeface="Yu Gothic" panose="020B0400000000000000" pitchFamily="34" charset="-128"/>
               </a:rPr>
@@ -6168,7 +6191,7 @@
           <a:p>
             <a:pPr lvl="1"/>
             <a:r>
-              <a:rPr lang="en-US" dirty="0">
+              <a:rPr lang="en-US">
                 <a:latin typeface="Yu Gothic" panose="020B0400000000000000" pitchFamily="34" charset="-128"/>
                 <a:ea typeface="Yu Gothic" panose="020B0400000000000000" pitchFamily="34" charset="-128"/>
               </a:rPr>
@@ -6176,7 +6199,7 @@
             </a:r>
           </a:p>
           <a:p>
-            <a:endParaRPr lang="en-US" dirty="0">
+            <a:endParaRPr lang="en-US">
               <a:latin typeface="Yu Gothic" panose="020B0400000000000000" pitchFamily="34" charset="-128"/>
               <a:ea typeface="Yu Gothic" panose="020B0400000000000000" pitchFamily="34" charset="-128"/>
             </a:endParaRPr>
@@ -6235,7 +6258,7 @@
           <a:lstStyle/>
           <a:p>
             <a:r>
-              <a:rPr lang="en-US" dirty="0">
+              <a:rPr lang="en-US">
                 <a:latin typeface="Yu Gothic" panose="020B0400000000000000" pitchFamily="34" charset="-128"/>
                 <a:ea typeface="Yu Gothic" panose="020B0400000000000000" pitchFamily="34" charset="-128"/>
               </a:rPr>
@@ -6268,7 +6291,7 @@
           <a:lstStyle/>
           <a:p>
             <a:r>
-              <a:rPr lang="en-US" dirty="0">
+              <a:rPr lang="en-US">
                 <a:latin typeface="Yu Gothic" panose="020B0400000000000000" pitchFamily="34" charset="-128"/>
                 <a:ea typeface="Yu Gothic" panose="020B0400000000000000" pitchFamily="34" charset="-128"/>
               </a:rPr>
@@ -6278,7 +6301,7 @@
           <a:p>
             <a:pPr lvl="1"/>
             <a:r>
-              <a:rPr lang="en-US" dirty="0">
+              <a:rPr lang="en-US">
                 <a:latin typeface="Yu Gothic" panose="020B0400000000000000" pitchFamily="34" charset="-128"/>
                 <a:ea typeface="Yu Gothic" panose="020B0400000000000000" pitchFamily="34" charset="-128"/>
               </a:rPr>
@@ -6288,7 +6311,7 @@
           <a:p>
             <a:pPr lvl="1"/>
             <a:r>
-              <a:rPr lang="en-US" dirty="0">
+              <a:rPr lang="en-US">
                 <a:latin typeface="Yu Gothic" panose="020B0400000000000000" pitchFamily="34" charset="-128"/>
                 <a:ea typeface="Yu Gothic" panose="020B0400000000000000" pitchFamily="34" charset="-128"/>
               </a:rPr>
@@ -6297,7 +6320,7 @@
           </a:p>
           <a:p>
             <a:r>
-              <a:rPr lang="en-US" dirty="0">
+              <a:rPr lang="en-US">
                 <a:latin typeface="Yu Gothic" panose="020B0400000000000000" pitchFamily="34" charset="-128"/>
                 <a:ea typeface="Yu Gothic" panose="020B0400000000000000" pitchFamily="34" charset="-128"/>
               </a:rPr>
@@ -6306,23 +6329,12 @@
           </a:p>
           <a:p>
             <a:r>
-              <a:rPr lang="en-US" dirty="0">
-                <a:latin typeface="Yu Gothic" panose="020B0400000000000000" pitchFamily="34" charset="-128"/>
-                <a:ea typeface="Yu Gothic" panose="020B0400000000000000" pitchFamily="34" charset="-128"/>
-              </a:rPr>
-              <a:t>I’m chatting with Eduardo soon about updates to our </a:t>
-            </a:r>
-            <a:r>
               <a:rPr lang="en-US">
                 <a:latin typeface="Yu Gothic" panose="020B0400000000000000" pitchFamily="34" charset="-128"/>
                 <a:ea typeface="Yu Gothic" panose="020B0400000000000000" pitchFamily="34" charset="-128"/>
               </a:rPr>
-              <a:t>DFE inference methods</a:t>
-            </a:r>
-            <a:endParaRPr lang="en-US" dirty="0">
-              <a:latin typeface="Yu Gothic" panose="020B0400000000000000" pitchFamily="34" charset="-128"/>
-              <a:ea typeface="Yu Gothic" panose="020B0400000000000000" pitchFamily="34" charset="-128"/>
-            </a:endParaRPr>
+              <a:t>I’m chatting with Eduardo soon about updates to our DFE inference methods</a:t>
+            </a:r>
           </a:p>
         </p:txBody>
       </p:sp>
@@ -6409,7 +6421,7 @@
                     <a:lstStyle/>
                     <a:p>
                       <a:r>
-                        <a:rPr lang="en-US" sz="1600" dirty="0">
+                        <a:rPr lang="en-US" sz="1600">
                           <a:latin typeface="Yu Gothic" panose="020B0400000000000000" pitchFamily="34" charset="-128"/>
                           <a:ea typeface="Yu Gothic" panose="020B0400000000000000" pitchFamily="34" charset="-128"/>
                         </a:rPr>
@@ -6425,7 +6437,7 @@
                     <a:lstStyle/>
                     <a:p>
                       <a:r>
-                        <a:rPr lang="en-US" sz="1600" dirty="0">
+                        <a:rPr lang="en-US" sz="1600">
                           <a:latin typeface="Yu Gothic" panose="020B0400000000000000" pitchFamily="34" charset="-128"/>
                           <a:ea typeface="Yu Gothic" panose="020B0400000000000000" pitchFamily="34" charset="-128"/>
                         </a:rPr>
@@ -6464,7 +6476,7 @@
                     <a:lstStyle/>
                     <a:p>
                       <a:r>
-                        <a:rPr lang="en-US" sz="1600" dirty="0">
+                        <a:rPr lang="en-US" sz="1600">
                           <a:latin typeface="Yu Gothic" panose="020B0400000000000000" pitchFamily="34" charset="-128"/>
                           <a:ea typeface="Yu Gothic" panose="020B0400000000000000" pitchFamily="34" charset="-128"/>
                         </a:rPr>
@@ -6487,7 +6499,7 @@
                     <a:lstStyle/>
                     <a:p>
                       <a:r>
-                        <a:rPr lang="en-US" sz="1600" dirty="0">
+                        <a:rPr lang="en-US" sz="1600">
                           <a:latin typeface="Yu Gothic" panose="020B0400000000000000" pitchFamily="34" charset="-128"/>
                           <a:ea typeface="Yu Gothic" panose="020B0400000000000000" pitchFamily="34" charset="-128"/>
                         </a:rPr>
@@ -6503,7 +6515,7 @@
                     <a:lstStyle/>
                     <a:p>
                       <a:r>
-                        <a:rPr lang="en-US" sz="1600" dirty="0">
+                        <a:rPr lang="en-US" sz="1600">
                           <a:latin typeface="Yu Gothic" panose="020B0400000000000000" pitchFamily="34" charset="-128"/>
                           <a:ea typeface="Yu Gothic" panose="020B0400000000000000" pitchFamily="34" charset="-128"/>
                         </a:rPr>
@@ -6526,7 +6538,7 @@
                     <a:lstStyle/>
                     <a:p>
                       <a:r>
-                        <a:rPr lang="en-US" sz="1600" dirty="0">
+                        <a:rPr lang="en-US" sz="1600">
                           <a:latin typeface="Yu Gothic" panose="020B0400000000000000" pitchFamily="34" charset="-128"/>
                           <a:ea typeface="Yu Gothic" panose="020B0400000000000000" pitchFamily="34" charset="-128"/>
                         </a:rPr>
@@ -6542,7 +6554,7 @@
                     <a:lstStyle/>
                     <a:p>
                       <a:r>
-                        <a:rPr lang="en-US" sz="1600" dirty="0">
+                        <a:rPr lang="en-US" sz="1600">
                           <a:latin typeface="Yu Gothic" panose="020B0400000000000000" pitchFamily="34" charset="-128"/>
                           <a:ea typeface="Yu Gothic" panose="020B0400000000000000" pitchFamily="34" charset="-128"/>
                         </a:rPr>
@@ -6581,7 +6593,7 @@
                     <a:lstStyle/>
                     <a:p>
                       <a:r>
-                        <a:rPr lang="en-US" sz="1600" dirty="0">
+                        <a:rPr lang="en-US" sz="1600">
                           <a:latin typeface="Yu Gothic" panose="020B0400000000000000" pitchFamily="34" charset="-128"/>
                           <a:ea typeface="Yu Gothic" panose="020B0400000000000000" pitchFamily="34" charset="-128"/>
                         </a:rPr>
@@ -6631,6 +6643,47 @@
           </a:prstGeom>
         </p:spPr>
       </p:pic>
+      <p:sp>
+        <p:nvSpPr>
+          <p:cNvPr id="2" name="TextBox 1">
+            <a:extLst>
+              <a:ext uri="{FF2B5EF4-FFF2-40B4-BE49-F238E27FC236}">
+                <a16:creationId xmlns:a16="http://schemas.microsoft.com/office/drawing/2014/main" id="{7C5B88DB-321D-4C7F-8B32-1B8D14A21102}"/>
+              </a:ext>
+            </a:extLst>
+          </p:cNvPr>
+          <p:cNvSpPr txBox="1"/>
+          <p:nvPr/>
+        </p:nvSpPr>
+        <p:spPr>
+          <a:xfrm>
+            <a:off x="7359588" y="523783"/>
+            <a:ext cx="4234649" cy="923330"/>
+          </a:xfrm>
+          <a:prstGeom prst="rect">
+            <a:avLst/>
+          </a:prstGeom>
+          <a:noFill/>
+        </p:spPr>
+        <p:txBody>
+          <a:bodyPr wrap="square" rtlCol="0">
+            <a:spAutoFit/>
+          </a:bodyPr>
+          <a:lstStyle/>
+          <a:p>
+            <a:r>
+              <a:rPr lang="en-US"/>
+              <a:t>For paper, focus on evidence for claims, e.g., rigorously test alternative hypothesis</a:t>
+            </a:r>
+          </a:p>
+          <a:p>
+            <a:r>
+              <a:rPr lang="en-US"/>
+              <a:t>for our story.</a:t>
+            </a:r>
+          </a:p>
+        </p:txBody>
+      </p:sp>
     </p:spTree>
     <p:extLst>
       <p:ext uri="{BB962C8B-B14F-4D97-AF65-F5344CB8AC3E}">
@@ -6714,7 +6767,7 @@
                     <a:lstStyle/>
                     <a:p>
                       <a:r>
-                        <a:rPr lang="en-US" sz="1600" dirty="0">
+                        <a:rPr lang="en-US" sz="1600">
                           <a:latin typeface="Yu Gothic" panose="020B0400000000000000" pitchFamily="34" charset="-128"/>
                           <a:ea typeface="Yu Gothic" panose="020B0400000000000000" pitchFamily="34" charset="-128"/>
                         </a:rPr>
@@ -6730,7 +6783,7 @@
                     <a:lstStyle/>
                     <a:p>
                       <a:r>
-                        <a:rPr lang="en-US" sz="1600" dirty="0">
+                        <a:rPr lang="en-US" sz="1600">
                           <a:latin typeface="Yu Gothic" panose="020B0400000000000000" pitchFamily="34" charset="-128"/>
                           <a:ea typeface="Yu Gothic" panose="020B0400000000000000" pitchFamily="34" charset="-128"/>
                         </a:rPr>
@@ -6792,7 +6845,7 @@
                     <a:lstStyle/>
                     <a:p>
                       <a:r>
-                        <a:rPr lang="en-US" sz="1600" dirty="0">
+                        <a:rPr lang="en-US" sz="1600">
                           <a:latin typeface="Yu Gothic" panose="020B0400000000000000" pitchFamily="34" charset="-128"/>
                           <a:ea typeface="Yu Gothic" panose="020B0400000000000000" pitchFamily="34" charset="-128"/>
                         </a:rPr>
@@ -6808,7 +6861,7 @@
                     <a:lstStyle/>
                     <a:p>
                       <a:r>
-                        <a:rPr lang="en-US" sz="1600" dirty="0">
+                        <a:rPr lang="en-US" sz="1600">
                           <a:latin typeface="Yu Gothic" panose="020B0400000000000000" pitchFamily="34" charset="-128"/>
                           <a:ea typeface="Yu Gothic" panose="020B0400000000000000" pitchFamily="34" charset="-128"/>
                         </a:rPr>
@@ -6831,7 +6884,7 @@
                     <a:lstStyle/>
                     <a:p>
                       <a:r>
-                        <a:rPr lang="en-US" sz="1600" dirty="0">
+                        <a:rPr lang="en-US" sz="1600">
                           <a:latin typeface="Yu Gothic" panose="020B0400000000000000" pitchFamily="34" charset="-128"/>
                           <a:ea typeface="Yu Gothic" panose="020B0400000000000000" pitchFamily="34" charset="-128"/>
                         </a:rPr>
@@ -6847,7 +6900,7 @@
                     <a:lstStyle/>
                     <a:p>
                       <a:r>
-                        <a:rPr lang="en-US" sz="1600" dirty="0">
+                        <a:rPr lang="en-US" sz="1600">
                           <a:latin typeface="Yu Gothic" panose="020B0400000000000000" pitchFamily="34" charset="-128"/>
                           <a:ea typeface="Yu Gothic" panose="020B0400000000000000" pitchFamily="34" charset="-128"/>
                         </a:rPr>
@@ -6886,7 +6939,7 @@
                     <a:lstStyle/>
                     <a:p>
                       <a:r>
-                        <a:rPr lang="en-US" sz="1600" dirty="0">
+                        <a:rPr lang="en-US" sz="1600">
                           <a:latin typeface="Yu Gothic" panose="020B0400000000000000" pitchFamily="34" charset="-128"/>
                           <a:ea typeface="Yu Gothic" panose="020B0400000000000000" pitchFamily="34" charset="-128"/>
                         </a:rPr>
@@ -7019,7 +7072,7 @@
                     <a:lstStyle/>
                     <a:p>
                       <a:r>
-                        <a:rPr lang="en-US" sz="1600" dirty="0">
+                        <a:rPr lang="en-US" sz="1600">
                           <a:latin typeface="Yu Gothic" panose="020B0400000000000000" pitchFamily="34" charset="-128"/>
                           <a:ea typeface="Yu Gothic" panose="020B0400000000000000" pitchFamily="34" charset="-128"/>
                         </a:rPr>
@@ -7035,7 +7088,7 @@
                     <a:lstStyle/>
                     <a:p>
                       <a:r>
-                        <a:rPr lang="en-US" sz="1600" dirty="0">
+                        <a:rPr lang="en-US" sz="1600">
                           <a:latin typeface="Yu Gothic" panose="020B0400000000000000" pitchFamily="34" charset="-128"/>
                           <a:ea typeface="Yu Gothic" panose="020B0400000000000000" pitchFamily="34" charset="-128"/>
                         </a:rPr>
@@ -7074,7 +7127,7 @@
                     <a:lstStyle/>
                     <a:p>
                       <a:r>
-                        <a:rPr lang="en-US" sz="1600" dirty="0">
+                        <a:rPr lang="en-US" sz="1600">
                           <a:latin typeface="Yu Gothic" panose="020B0400000000000000" pitchFamily="34" charset="-128"/>
                           <a:ea typeface="Yu Gothic" panose="020B0400000000000000" pitchFamily="34" charset="-128"/>
                         </a:rPr>
@@ -7097,7 +7150,7 @@
                     <a:lstStyle/>
                     <a:p>
                       <a:r>
-                        <a:rPr lang="en-US" sz="1600" dirty="0">
+                        <a:rPr lang="en-US" sz="1600">
                           <a:latin typeface="Yu Gothic" panose="020B0400000000000000" pitchFamily="34" charset="-128"/>
                           <a:ea typeface="Yu Gothic" panose="020B0400000000000000" pitchFamily="34" charset="-128"/>
                         </a:rPr>
@@ -7113,7 +7166,7 @@
                     <a:lstStyle/>
                     <a:p>
                       <a:r>
-                        <a:rPr lang="en-US" sz="1600" dirty="0">
+                        <a:rPr lang="en-US" sz="1600">
                           <a:latin typeface="Yu Gothic" panose="020B0400000000000000" pitchFamily="34" charset="-128"/>
                           <a:ea typeface="Yu Gothic" panose="020B0400000000000000" pitchFamily="34" charset="-128"/>
                         </a:rPr>
@@ -7136,7 +7189,7 @@
                     <a:lstStyle/>
                     <a:p>
                       <a:r>
-                        <a:rPr lang="en-US" sz="1600" dirty="0">
+                        <a:rPr lang="en-US" sz="1600">
                           <a:latin typeface="Yu Gothic" panose="020B0400000000000000" pitchFamily="34" charset="-128"/>
                           <a:ea typeface="Yu Gothic" panose="020B0400000000000000" pitchFamily="34" charset="-128"/>
                         </a:rPr>
@@ -7152,7 +7205,7 @@
                     <a:lstStyle/>
                     <a:p>
                       <a:r>
-                        <a:rPr lang="en-US" sz="1600" dirty="0">
+                        <a:rPr lang="en-US" sz="1600">
                           <a:latin typeface="Yu Gothic" panose="020B0400000000000000" pitchFamily="34" charset="-128"/>
                           <a:ea typeface="Yu Gothic" panose="020B0400000000000000" pitchFamily="34" charset="-128"/>
                         </a:rPr>
@@ -7191,7 +7244,7 @@
                     <a:lstStyle/>
                     <a:p>
                       <a:r>
-                        <a:rPr lang="en-US" sz="1600" dirty="0">
+                        <a:rPr lang="en-US" sz="1600">
                           <a:latin typeface="Yu Gothic" panose="020B0400000000000000" pitchFamily="34" charset="-128"/>
                           <a:ea typeface="Yu Gothic" panose="020B0400000000000000" pitchFamily="34" charset="-128"/>
                         </a:rPr>
@@ -7318,7 +7371,7 @@
                     <a:lstStyle/>
                     <a:p>
                       <a:r>
-                        <a:rPr lang="en-US" sz="1600" dirty="0">
+                        <a:rPr lang="en-US" sz="1600">
                           <a:latin typeface="Yu Gothic" panose="020B0400000000000000" pitchFamily="34" charset="-128"/>
                           <a:ea typeface="Yu Gothic" panose="020B0400000000000000" pitchFamily="34" charset="-128"/>
                         </a:rPr>
@@ -7334,7 +7387,7 @@
                     <a:lstStyle/>
                     <a:p>
                       <a:r>
-                        <a:rPr lang="en-US" sz="1600" dirty="0">
+                        <a:rPr lang="en-US" sz="1600">
                           <a:latin typeface="Yu Gothic" panose="020B0400000000000000" pitchFamily="34" charset="-128"/>
                           <a:ea typeface="Yu Gothic" panose="020B0400000000000000" pitchFamily="34" charset="-128"/>
                         </a:rPr>
@@ -7396,7 +7449,7 @@
                     <a:lstStyle/>
                     <a:p>
                       <a:r>
-                        <a:rPr lang="en-US" sz="1600" dirty="0">
+                        <a:rPr lang="en-US" sz="1600">
                           <a:latin typeface="Yu Gothic" panose="020B0400000000000000" pitchFamily="34" charset="-128"/>
                           <a:ea typeface="Yu Gothic" panose="020B0400000000000000" pitchFamily="34" charset="-128"/>
                         </a:rPr>
@@ -7412,7 +7465,7 @@
                     <a:lstStyle/>
                     <a:p>
                       <a:r>
-                        <a:rPr lang="en-US" sz="1600" dirty="0">
+                        <a:rPr lang="en-US" sz="1600">
                           <a:latin typeface="Yu Gothic" panose="020B0400000000000000" pitchFamily="34" charset="-128"/>
                           <a:ea typeface="Yu Gothic" panose="020B0400000000000000" pitchFamily="34" charset="-128"/>
                         </a:rPr>
@@ -7435,7 +7488,7 @@
                     <a:lstStyle/>
                     <a:p>
                       <a:r>
-                        <a:rPr lang="en-US" sz="1600" dirty="0">
+                        <a:rPr lang="en-US" sz="1600">
                           <a:latin typeface="Yu Gothic" panose="020B0400000000000000" pitchFamily="34" charset="-128"/>
                           <a:ea typeface="Yu Gothic" panose="020B0400000000000000" pitchFamily="34" charset="-128"/>
                         </a:rPr>
@@ -7451,7 +7504,7 @@
                     <a:lstStyle/>
                     <a:p>
                       <a:r>
-                        <a:rPr lang="en-US" sz="1600" dirty="0">
+                        <a:rPr lang="en-US" sz="1600">
                           <a:latin typeface="Yu Gothic" panose="020B0400000000000000" pitchFamily="34" charset="-128"/>
                           <a:ea typeface="Yu Gothic" panose="020B0400000000000000" pitchFamily="34" charset="-128"/>
                         </a:rPr>
@@ -7490,7 +7543,7 @@
                     <a:lstStyle/>
                     <a:p>
                       <a:r>
-                        <a:rPr lang="en-US" sz="1600" dirty="0">
+                        <a:rPr lang="en-US" sz="1600">
                           <a:latin typeface="Yu Gothic" panose="020B0400000000000000" pitchFamily="34" charset="-128"/>
                           <a:ea typeface="Yu Gothic" panose="020B0400000000000000" pitchFamily="34" charset="-128"/>
                         </a:rPr>
@@ -7623,7 +7676,7 @@
                     <a:lstStyle/>
                     <a:p>
                       <a:r>
-                        <a:rPr lang="en-US" sz="1600" dirty="0">
+                        <a:rPr lang="en-US" sz="1600">
                           <a:latin typeface="Yu Gothic" panose="020B0400000000000000" pitchFamily="34" charset="-128"/>
                           <a:ea typeface="Yu Gothic" panose="020B0400000000000000" pitchFamily="34" charset="-128"/>
                         </a:rPr>
@@ -7639,7 +7692,7 @@
                     <a:lstStyle/>
                     <a:p>
                       <a:r>
-                        <a:rPr lang="en-US" sz="1600" dirty="0">
+                        <a:rPr lang="en-US" sz="1600">
                           <a:latin typeface="Yu Gothic" panose="020B0400000000000000" pitchFamily="34" charset="-128"/>
                           <a:ea typeface="Yu Gothic" panose="020B0400000000000000" pitchFamily="34" charset="-128"/>
                         </a:rPr>
@@ -7695,7 +7748,7 @@
                         <a:defRPr/>
                       </a:pPr>
                       <a:r>
-                        <a:rPr lang="en-US" sz="1600" dirty="0">
+                        <a:rPr lang="en-US" sz="1600">
                           <a:latin typeface="Yu Gothic" panose="020B0400000000000000" pitchFamily="34" charset="-128"/>
                           <a:ea typeface="Yu Gothic" panose="020B0400000000000000" pitchFamily="34" charset="-128"/>
                         </a:rPr>
@@ -7718,7 +7771,7 @@
                     <a:lstStyle/>
                     <a:p>
                       <a:r>
-                        <a:rPr lang="en-US" sz="1600" dirty="0">
+                        <a:rPr lang="en-US" sz="1600">
                           <a:latin typeface="Yu Gothic" panose="020B0400000000000000" pitchFamily="34" charset="-128"/>
                           <a:ea typeface="Yu Gothic" panose="020B0400000000000000" pitchFamily="34" charset="-128"/>
                         </a:rPr>
@@ -7734,7 +7787,7 @@
                     <a:lstStyle/>
                     <a:p>
                       <a:r>
-                        <a:rPr lang="en-US" sz="1600" dirty="0">
+                        <a:rPr lang="en-US" sz="1600">
                           <a:latin typeface="Yu Gothic" panose="020B0400000000000000" pitchFamily="34" charset="-128"/>
                           <a:ea typeface="Yu Gothic" panose="020B0400000000000000" pitchFamily="34" charset="-128"/>
                         </a:rPr>
@@ -7757,7 +7810,7 @@
                     <a:lstStyle/>
                     <a:p>
                       <a:r>
-                        <a:rPr lang="en-US" sz="1600" dirty="0">
+                        <a:rPr lang="en-US" sz="1600">
                           <a:latin typeface="Yu Gothic" panose="020B0400000000000000" pitchFamily="34" charset="-128"/>
                           <a:ea typeface="Yu Gothic" panose="020B0400000000000000" pitchFamily="34" charset="-128"/>
                         </a:rPr>
@@ -7773,7 +7826,7 @@
                     <a:lstStyle/>
                     <a:p>
                       <a:r>
-                        <a:rPr lang="en-US" sz="1600" dirty="0">
+                        <a:rPr lang="en-US" sz="1600">
                           <a:latin typeface="Yu Gothic" panose="020B0400000000000000" pitchFamily="34" charset="-128"/>
                           <a:ea typeface="Yu Gothic" panose="020B0400000000000000" pitchFamily="34" charset="-128"/>
                         </a:rPr>
@@ -7812,7 +7865,7 @@
                     <a:lstStyle/>
                     <a:p>
                       <a:r>
-                        <a:rPr lang="en-US" sz="1600" dirty="0">
+                        <a:rPr lang="en-US" sz="1600">
                           <a:latin typeface="Yu Gothic" panose="020B0400000000000000" pitchFamily="34" charset="-128"/>
                           <a:ea typeface="Yu Gothic" panose="020B0400000000000000" pitchFamily="34" charset="-128"/>
                         </a:rPr>
@@ -7862,6 +7915,71 @@
           </a:prstGeom>
         </p:spPr>
       </p:pic>
+      <p:sp>
+        <p:nvSpPr>
+          <p:cNvPr id="2" name="TextBox 1">
+            <a:extLst>
+              <a:ext uri="{FF2B5EF4-FFF2-40B4-BE49-F238E27FC236}">
+                <a16:creationId xmlns:a16="http://schemas.microsoft.com/office/drawing/2014/main" id="{08A20C09-648C-44FE-837C-FEB3D847C193}"/>
+              </a:ext>
+            </a:extLst>
+          </p:cNvPr>
+          <p:cNvSpPr txBox="1"/>
+          <p:nvPr/>
+        </p:nvSpPr>
+        <p:spPr>
+          <a:xfrm>
+            <a:off x="7111014" y="852256"/>
+            <a:ext cx="4489114" cy="1200329"/>
+          </a:xfrm>
+          <a:prstGeom prst="rect">
+            <a:avLst/>
+          </a:prstGeom>
+          <a:noFill/>
+        </p:spPr>
+        <p:txBody>
+          <a:bodyPr wrap="none" rtlCol="0">
+            <a:spAutoFit/>
+          </a:bodyPr>
+          <a:lstStyle/>
+          <a:p>
+            <a:r>
+              <a:rPr lang="en-US"/>
+              <a:t>Supplement / writing:</a:t>
+            </a:r>
+          </a:p>
+          <a:p>
+            <a:pPr marL="285750" indent="-285750">
+              <a:buFont typeface="Arial" panose="020B0604020202020204" pitchFamily="34" charset="0"/>
+              <a:buChar char="•"/>
+            </a:pPr>
+            <a:r>
+              <a:rPr lang="en-US"/>
+              <a:t>What happens when we include singletons</a:t>
+            </a:r>
+          </a:p>
+          <a:p>
+            <a:pPr marL="285750" indent="-285750">
+              <a:buFont typeface="Arial" panose="020B0604020202020204" pitchFamily="34" charset="0"/>
+              <a:buChar char="•"/>
+            </a:pPr>
+            <a:r>
+              <a:rPr lang="en-US"/>
+              <a:t>Take observations and put them into prose</a:t>
+            </a:r>
+          </a:p>
+          <a:p>
+            <a:pPr marL="742950" lvl="1" indent="-285750">
+              <a:buFont typeface="Arial" panose="020B0604020202020204" pitchFamily="34" charset="0"/>
+              <a:buChar char="•"/>
+            </a:pPr>
+            <a:r>
+              <a:rPr lang="en-US"/>
+              <a:t>With testing</a:t>
+            </a:r>
+          </a:p>
+        </p:txBody>
+      </p:sp>
     </p:spTree>
     <p:extLst>
       <p:ext uri="{BB962C8B-B14F-4D97-AF65-F5344CB8AC3E}">
@@ -7945,7 +8063,7 @@
                     <a:lstStyle/>
                     <a:p>
                       <a:r>
-                        <a:rPr lang="en-US" sz="1600" dirty="0">
+                        <a:rPr lang="en-US" sz="1600">
                           <a:latin typeface="Yu Gothic" panose="020B0400000000000000" pitchFamily="34" charset="-128"/>
                           <a:ea typeface="Yu Gothic" panose="020B0400000000000000" pitchFamily="34" charset="-128"/>
                         </a:rPr>
@@ -7961,7 +8079,7 @@
                     <a:lstStyle/>
                     <a:p>
                       <a:r>
-                        <a:rPr lang="en-US" sz="1600" dirty="0">
+                        <a:rPr lang="en-US" sz="1600">
                           <a:latin typeface="Yu Gothic" panose="020B0400000000000000" pitchFamily="34" charset="-128"/>
                           <a:ea typeface="Yu Gothic" panose="020B0400000000000000" pitchFamily="34" charset="-128"/>
                         </a:rPr>
@@ -8000,7 +8118,7 @@
                     <a:lstStyle/>
                     <a:p>
                       <a:r>
-                        <a:rPr lang="en-US" sz="1600" dirty="0">
+                        <a:rPr lang="en-US" sz="1600">
                           <a:latin typeface="Yu Gothic" panose="020B0400000000000000" pitchFamily="34" charset="-128"/>
                           <a:ea typeface="Yu Gothic" panose="020B0400000000000000" pitchFamily="34" charset="-128"/>
                         </a:rPr>
@@ -8023,7 +8141,7 @@
                     <a:lstStyle/>
                     <a:p>
                       <a:r>
-                        <a:rPr lang="en-US" sz="1600" dirty="0">
+                        <a:rPr lang="en-US" sz="1600">
                           <a:latin typeface="Yu Gothic" panose="020B0400000000000000" pitchFamily="34" charset="-128"/>
                           <a:ea typeface="Yu Gothic" panose="020B0400000000000000" pitchFamily="34" charset="-128"/>
                         </a:rPr>
@@ -8039,7 +8157,7 @@
                     <a:lstStyle/>
                     <a:p>
                       <a:r>
-                        <a:rPr lang="en-US" sz="1600" dirty="0">
+                        <a:rPr lang="en-US" sz="1600">
                           <a:latin typeface="Yu Gothic" panose="020B0400000000000000" pitchFamily="34" charset="-128"/>
                           <a:ea typeface="Yu Gothic" panose="020B0400000000000000" pitchFamily="34" charset="-128"/>
                         </a:rPr>
@@ -8062,7 +8180,7 @@
                     <a:lstStyle/>
                     <a:p>
                       <a:r>
-                        <a:rPr lang="en-US" sz="1600" dirty="0">
+                        <a:rPr lang="en-US" sz="1600">
                           <a:latin typeface="Yu Gothic" panose="020B0400000000000000" pitchFamily="34" charset="-128"/>
                           <a:ea typeface="Yu Gothic" panose="020B0400000000000000" pitchFamily="34" charset="-128"/>
                         </a:rPr>
@@ -8078,7 +8196,7 @@
                     <a:lstStyle/>
                     <a:p>
                       <a:r>
-                        <a:rPr lang="en-US" sz="1600" dirty="0">
+                        <a:rPr lang="en-US" sz="1600">
                           <a:latin typeface="Yu Gothic" panose="020B0400000000000000" pitchFamily="34" charset="-128"/>
                           <a:ea typeface="Yu Gothic" panose="020B0400000000000000" pitchFamily="34" charset="-128"/>
                         </a:rPr>
@@ -8117,7 +8235,7 @@
                     <a:lstStyle/>
                     <a:p>
                       <a:r>
-                        <a:rPr lang="en-US" sz="1600" dirty="0">
+                        <a:rPr lang="en-US" sz="1600">
                           <a:latin typeface="Yu Gothic" panose="020B0400000000000000" pitchFamily="34" charset="-128"/>
                           <a:ea typeface="Yu Gothic" panose="020B0400000000000000" pitchFamily="34" charset="-128"/>
                         </a:rPr>

</xml_diff>